<commit_message>
AZ vnet deployments with sql db and VM's
</commit_message>
<xml_diff>
--- a/week-4_az_networking/vnets/Virtual network in azure.pptx
+++ b/week-4_az_networking/vnets/Virtual network in azure.pptx
@@ -17,21 +17,26 @@
     <p:sldId id="262" r:id="rId12"/>
     <p:sldId id="263" r:id="rId13"/>
     <p:sldId id="264" r:id="rId14"/>
+    <p:sldId id="265" r:id="rId15"/>
+    <p:sldId id="266" r:id="rId16"/>
+    <p:sldId id="267" r:id="rId17"/>
+    <p:sldId id="268" r:id="rId18"/>
+    <p:sldId id="269" r:id="rId19"/>
   </p:sldIdLst>
   <p:sldSz cy="5143500" cx="9144000"/>
   <p:notesSz cx="6858000" cy="9144000"/>
   <p:embeddedFontLst>
     <p:embeddedFont>
       <p:font typeface="Amatic SC"/>
-      <p:regular r:id="rId15"/>
-      <p:bold r:id="rId16"/>
+      <p:regular r:id="rId20"/>
+      <p:bold r:id="rId21"/>
     </p:embeddedFont>
     <p:embeddedFont>
       <p:font typeface="Source Code Pro"/>
-      <p:regular r:id="rId17"/>
-      <p:bold r:id="rId18"/>
-      <p:italic r:id="rId19"/>
-      <p:boldItalic r:id="rId20"/>
+      <p:regular r:id="rId22"/>
+      <p:bold r:id="rId23"/>
+      <p:italic r:id="rId24"/>
+      <p:boldItalic r:id="rId25"/>
     </p:embeddedFont>
   </p:embeddedFontLst>
   <p:defaultTextStyle>
@@ -763,6 +768,501 @@
       <p:sp>
         <p:nvSpPr>
           <p:cNvPr id="54" name="Google Shape;54;p:notes"/>
+          <p:cNvSpPr txBox="1"/>
+          <p:nvPr>
+            <p:ph idx="1" type="body"/>
+          </p:nvPr>
+        </p:nvSpPr>
+        <p:spPr>
+          <a:xfrm>
+            <a:off x="685800" y="4343400"/>
+            <a:ext cx="5486400" cy="4114800"/>
+          </a:xfrm>
+          <a:prstGeom prst="rect">
+            <a:avLst/>
+          </a:prstGeom>
+        </p:spPr>
+        <p:txBody>
+          <a:bodyPr anchorCtr="0" anchor="t" bIns="91425" lIns="91425" spcFirstLastPara="1" rIns="91425" wrap="square" tIns="91425">
+            <a:noAutofit/>
+          </a:bodyPr>
+          <a:lstStyle/>
+          <a:p>
+            <a:pPr indent="0" lvl="0" marL="0" rtl="0" algn="l">
+              <a:spcBef>
+                <a:spcPts val="0"/>
+              </a:spcBef>
+              <a:spcAft>
+                <a:spcPts val="0"/>
+              </a:spcAft>
+              <a:buNone/>
+            </a:pPr>
+            <a:r>
+              <a:t/>
+            </a:r>
+            <a:endParaRPr/>
+          </a:p>
+        </p:txBody>
+      </p:sp>
+    </p:spTree>
+  </p:cSld>
+  <p:clrMapOvr>
+    <a:masterClrMapping/>
+  </p:clrMapOvr>
+</p:notes>
+</file>
+
+<file path=ppt/notesSlides/notesSlide10.xml><?xml version="1.0" encoding="utf-8"?>
+<p:notes xmlns:a="http://schemas.openxmlformats.org/drawingml/2006/main" xmlns:r="http://schemas.openxmlformats.org/officeDocument/2006/relationships" xmlns:mc="http://schemas.openxmlformats.org/markup-compatibility/2006" xmlns:mv="urn:schemas-microsoft-com:mac:vml" xmlns:p="http://schemas.openxmlformats.org/presentationml/2006/main" xmlns:c="http://schemas.openxmlformats.org/drawingml/2006/chart" xmlns:dgm="http://schemas.openxmlformats.org/drawingml/2006/diagram" xmlns:o="urn:schemas-microsoft-com:office:office" xmlns:v="urn:schemas-microsoft-com:vml" xmlns:pvml="urn:schemas-microsoft-com:office:powerpoint" xmlns:com="http://schemas.openxmlformats.org/drawingml/2006/compatibility" xmlns:p14="http://schemas.microsoft.com/office/powerpoint/2010/main" xmlns:p15="http://schemas.microsoft.com/office/powerpoint/2012/main" xmlns:ahyp="http://schemas.microsoft.com/office/drawing/2018/hyperlinkcolor" showMasterPhAnim="0" showMasterSp="0">
+  <p:cSld>
+    <p:spTree>
+      <p:nvGrpSpPr>
+        <p:cNvPr id="105" name="Shape 105"/>
+        <p:cNvGrpSpPr/>
+        <p:nvPr/>
+      </p:nvGrpSpPr>
+      <p:grpSpPr>
+        <a:xfrm>
+          <a:off x="0" y="0"/>
+          <a:ext cx="0" cy="0"/>
+          <a:chOff x="0" y="0"/>
+          <a:chExt cx="0" cy="0"/>
+        </a:xfrm>
+      </p:grpSpPr>
+      <p:sp>
+        <p:nvSpPr>
+          <p:cNvPr id="106" name="Google Shape;106;g2ea9fd44615_0_5:notes"/>
+          <p:cNvSpPr/>
+          <p:nvPr>
+            <p:ph idx="2" type="sldImg"/>
+          </p:nvPr>
+        </p:nvSpPr>
+        <p:spPr>
+          <a:xfrm>
+            <a:off x="381300" y="685800"/>
+            <a:ext cx="6096000" cy="3429000"/>
+          </a:xfrm>
+          <a:custGeom>
+            <a:rect b="b" l="l" r="r" t="t"/>
+            <a:pathLst>
+              <a:path extrusionOk="0" h="120000" w="120000">
+                <a:moveTo>
+                  <a:pt x="0" y="0"/>
+                </a:moveTo>
+                <a:lnTo>
+                  <a:pt x="120000" y="0"/>
+                </a:lnTo>
+                <a:lnTo>
+                  <a:pt x="120000" y="120000"/>
+                </a:lnTo>
+                <a:lnTo>
+                  <a:pt x="0" y="120000"/>
+                </a:lnTo>
+                <a:close/>
+              </a:path>
+            </a:pathLst>
+          </a:custGeom>
+        </p:spPr>
+      </p:sp>
+      <p:sp>
+        <p:nvSpPr>
+          <p:cNvPr id="107" name="Google Shape;107;g2ea9fd44615_0_5:notes"/>
+          <p:cNvSpPr txBox="1"/>
+          <p:nvPr>
+            <p:ph idx="1" type="body"/>
+          </p:nvPr>
+        </p:nvSpPr>
+        <p:spPr>
+          <a:xfrm>
+            <a:off x="685800" y="4343400"/>
+            <a:ext cx="5486400" cy="4114800"/>
+          </a:xfrm>
+          <a:prstGeom prst="rect">
+            <a:avLst/>
+          </a:prstGeom>
+        </p:spPr>
+        <p:txBody>
+          <a:bodyPr anchorCtr="0" anchor="t" bIns="91425" lIns="91425" spcFirstLastPara="1" rIns="91425" wrap="square" tIns="91425">
+            <a:noAutofit/>
+          </a:bodyPr>
+          <a:lstStyle/>
+          <a:p>
+            <a:pPr indent="0" lvl="0" marL="0" rtl="0" algn="l">
+              <a:spcBef>
+                <a:spcPts val="0"/>
+              </a:spcBef>
+              <a:spcAft>
+                <a:spcPts val="0"/>
+              </a:spcAft>
+              <a:buNone/>
+            </a:pPr>
+            <a:r>
+              <a:t/>
+            </a:r>
+            <a:endParaRPr/>
+          </a:p>
+        </p:txBody>
+      </p:sp>
+    </p:spTree>
+  </p:cSld>
+  <p:clrMapOvr>
+    <a:masterClrMapping/>
+  </p:clrMapOvr>
+</p:notes>
+</file>
+
+<file path=ppt/notesSlides/notesSlide11.xml><?xml version="1.0" encoding="utf-8"?>
+<p:notes xmlns:a="http://schemas.openxmlformats.org/drawingml/2006/main" xmlns:r="http://schemas.openxmlformats.org/officeDocument/2006/relationships" xmlns:mc="http://schemas.openxmlformats.org/markup-compatibility/2006" xmlns:mv="urn:schemas-microsoft-com:mac:vml" xmlns:p="http://schemas.openxmlformats.org/presentationml/2006/main" xmlns:c="http://schemas.openxmlformats.org/drawingml/2006/chart" xmlns:dgm="http://schemas.openxmlformats.org/drawingml/2006/diagram" xmlns:o="urn:schemas-microsoft-com:office:office" xmlns:v="urn:schemas-microsoft-com:vml" xmlns:pvml="urn:schemas-microsoft-com:office:powerpoint" xmlns:com="http://schemas.openxmlformats.org/drawingml/2006/compatibility" xmlns:p14="http://schemas.microsoft.com/office/powerpoint/2010/main" xmlns:p15="http://schemas.microsoft.com/office/powerpoint/2012/main" xmlns:ahyp="http://schemas.microsoft.com/office/drawing/2018/hyperlinkcolor" showMasterPhAnim="0" showMasterSp="0">
+  <p:cSld>
+    <p:spTree>
+      <p:nvGrpSpPr>
+        <p:cNvPr id="111" name="Shape 111"/>
+        <p:cNvGrpSpPr/>
+        <p:nvPr/>
+      </p:nvGrpSpPr>
+      <p:grpSpPr>
+        <a:xfrm>
+          <a:off x="0" y="0"/>
+          <a:ext cx="0" cy="0"/>
+          <a:chOff x="0" y="0"/>
+          <a:chExt cx="0" cy="0"/>
+        </a:xfrm>
+      </p:grpSpPr>
+      <p:sp>
+        <p:nvSpPr>
+          <p:cNvPr id="112" name="Google Shape;112;g2ea9fd44615_0_10:notes"/>
+          <p:cNvSpPr/>
+          <p:nvPr>
+            <p:ph idx="2" type="sldImg"/>
+          </p:nvPr>
+        </p:nvSpPr>
+        <p:spPr>
+          <a:xfrm>
+            <a:off x="381300" y="685800"/>
+            <a:ext cx="6096000" cy="3429000"/>
+          </a:xfrm>
+          <a:custGeom>
+            <a:rect b="b" l="l" r="r" t="t"/>
+            <a:pathLst>
+              <a:path extrusionOk="0" h="120000" w="120000">
+                <a:moveTo>
+                  <a:pt x="0" y="0"/>
+                </a:moveTo>
+                <a:lnTo>
+                  <a:pt x="120000" y="0"/>
+                </a:lnTo>
+                <a:lnTo>
+                  <a:pt x="120000" y="120000"/>
+                </a:lnTo>
+                <a:lnTo>
+                  <a:pt x="0" y="120000"/>
+                </a:lnTo>
+                <a:close/>
+              </a:path>
+            </a:pathLst>
+          </a:custGeom>
+        </p:spPr>
+      </p:sp>
+      <p:sp>
+        <p:nvSpPr>
+          <p:cNvPr id="113" name="Google Shape;113;g2ea9fd44615_0_10:notes"/>
+          <p:cNvSpPr txBox="1"/>
+          <p:nvPr>
+            <p:ph idx="1" type="body"/>
+          </p:nvPr>
+        </p:nvSpPr>
+        <p:spPr>
+          <a:xfrm>
+            <a:off x="685800" y="4343400"/>
+            <a:ext cx="5486400" cy="4114800"/>
+          </a:xfrm>
+          <a:prstGeom prst="rect">
+            <a:avLst/>
+          </a:prstGeom>
+        </p:spPr>
+        <p:txBody>
+          <a:bodyPr anchorCtr="0" anchor="t" bIns="91425" lIns="91425" spcFirstLastPara="1" rIns="91425" wrap="square" tIns="91425">
+            <a:noAutofit/>
+          </a:bodyPr>
+          <a:lstStyle/>
+          <a:p>
+            <a:pPr indent="0" lvl="0" marL="0" rtl="0" algn="l">
+              <a:spcBef>
+                <a:spcPts val="0"/>
+              </a:spcBef>
+              <a:spcAft>
+                <a:spcPts val="0"/>
+              </a:spcAft>
+              <a:buNone/>
+            </a:pPr>
+            <a:r>
+              <a:t/>
+            </a:r>
+            <a:endParaRPr/>
+          </a:p>
+        </p:txBody>
+      </p:sp>
+    </p:spTree>
+  </p:cSld>
+  <p:clrMapOvr>
+    <a:masterClrMapping/>
+  </p:clrMapOvr>
+</p:notes>
+</file>
+
+<file path=ppt/notesSlides/notesSlide12.xml><?xml version="1.0" encoding="utf-8"?>
+<p:notes xmlns:a="http://schemas.openxmlformats.org/drawingml/2006/main" xmlns:r="http://schemas.openxmlformats.org/officeDocument/2006/relationships" xmlns:mc="http://schemas.openxmlformats.org/markup-compatibility/2006" xmlns:mv="urn:schemas-microsoft-com:mac:vml" xmlns:p="http://schemas.openxmlformats.org/presentationml/2006/main" xmlns:c="http://schemas.openxmlformats.org/drawingml/2006/chart" xmlns:dgm="http://schemas.openxmlformats.org/drawingml/2006/diagram" xmlns:o="urn:schemas-microsoft-com:office:office" xmlns:v="urn:schemas-microsoft-com:vml" xmlns:pvml="urn:schemas-microsoft-com:office:powerpoint" xmlns:com="http://schemas.openxmlformats.org/drawingml/2006/compatibility" xmlns:p14="http://schemas.microsoft.com/office/powerpoint/2010/main" xmlns:p15="http://schemas.microsoft.com/office/powerpoint/2012/main" xmlns:ahyp="http://schemas.microsoft.com/office/drawing/2018/hyperlinkcolor" showMasterPhAnim="0" showMasterSp="0">
+  <p:cSld>
+    <p:spTree>
+      <p:nvGrpSpPr>
+        <p:cNvPr id="117" name="Shape 117"/>
+        <p:cNvGrpSpPr/>
+        <p:nvPr/>
+      </p:nvGrpSpPr>
+      <p:grpSpPr>
+        <a:xfrm>
+          <a:off x="0" y="0"/>
+          <a:ext cx="0" cy="0"/>
+          <a:chOff x="0" y="0"/>
+          <a:chExt cx="0" cy="0"/>
+        </a:xfrm>
+      </p:grpSpPr>
+      <p:sp>
+        <p:nvSpPr>
+          <p:cNvPr id="118" name="Google Shape;118;g2ea9fd44615_0_15:notes"/>
+          <p:cNvSpPr/>
+          <p:nvPr>
+            <p:ph idx="2" type="sldImg"/>
+          </p:nvPr>
+        </p:nvSpPr>
+        <p:spPr>
+          <a:xfrm>
+            <a:off x="381300" y="685800"/>
+            <a:ext cx="6096000" cy="3429000"/>
+          </a:xfrm>
+          <a:custGeom>
+            <a:rect b="b" l="l" r="r" t="t"/>
+            <a:pathLst>
+              <a:path extrusionOk="0" h="120000" w="120000">
+                <a:moveTo>
+                  <a:pt x="0" y="0"/>
+                </a:moveTo>
+                <a:lnTo>
+                  <a:pt x="120000" y="0"/>
+                </a:lnTo>
+                <a:lnTo>
+                  <a:pt x="120000" y="120000"/>
+                </a:lnTo>
+                <a:lnTo>
+                  <a:pt x="0" y="120000"/>
+                </a:lnTo>
+                <a:close/>
+              </a:path>
+            </a:pathLst>
+          </a:custGeom>
+        </p:spPr>
+      </p:sp>
+      <p:sp>
+        <p:nvSpPr>
+          <p:cNvPr id="119" name="Google Shape;119;g2ea9fd44615_0_15:notes"/>
+          <p:cNvSpPr txBox="1"/>
+          <p:nvPr>
+            <p:ph idx="1" type="body"/>
+          </p:nvPr>
+        </p:nvSpPr>
+        <p:spPr>
+          <a:xfrm>
+            <a:off x="685800" y="4343400"/>
+            <a:ext cx="5486400" cy="4114800"/>
+          </a:xfrm>
+          <a:prstGeom prst="rect">
+            <a:avLst/>
+          </a:prstGeom>
+        </p:spPr>
+        <p:txBody>
+          <a:bodyPr anchorCtr="0" anchor="t" bIns="91425" lIns="91425" spcFirstLastPara="1" rIns="91425" wrap="square" tIns="91425">
+            <a:noAutofit/>
+          </a:bodyPr>
+          <a:lstStyle/>
+          <a:p>
+            <a:pPr indent="0" lvl="0" marL="0" rtl="0" algn="l">
+              <a:spcBef>
+                <a:spcPts val="0"/>
+              </a:spcBef>
+              <a:spcAft>
+                <a:spcPts val="0"/>
+              </a:spcAft>
+              <a:buNone/>
+            </a:pPr>
+            <a:r>
+              <a:t/>
+            </a:r>
+            <a:endParaRPr/>
+          </a:p>
+        </p:txBody>
+      </p:sp>
+    </p:spTree>
+  </p:cSld>
+  <p:clrMapOvr>
+    <a:masterClrMapping/>
+  </p:clrMapOvr>
+</p:notes>
+</file>
+
+<file path=ppt/notesSlides/notesSlide13.xml><?xml version="1.0" encoding="utf-8"?>
+<p:notes xmlns:a="http://schemas.openxmlformats.org/drawingml/2006/main" xmlns:r="http://schemas.openxmlformats.org/officeDocument/2006/relationships" xmlns:mc="http://schemas.openxmlformats.org/markup-compatibility/2006" xmlns:mv="urn:schemas-microsoft-com:mac:vml" xmlns:p="http://schemas.openxmlformats.org/presentationml/2006/main" xmlns:c="http://schemas.openxmlformats.org/drawingml/2006/chart" xmlns:dgm="http://schemas.openxmlformats.org/drawingml/2006/diagram" xmlns:o="urn:schemas-microsoft-com:office:office" xmlns:v="urn:schemas-microsoft-com:vml" xmlns:pvml="urn:schemas-microsoft-com:office:powerpoint" xmlns:com="http://schemas.openxmlformats.org/drawingml/2006/compatibility" xmlns:p14="http://schemas.microsoft.com/office/powerpoint/2010/main" xmlns:p15="http://schemas.microsoft.com/office/powerpoint/2012/main" xmlns:ahyp="http://schemas.microsoft.com/office/drawing/2018/hyperlinkcolor" showMasterPhAnim="0" showMasterSp="0">
+  <p:cSld>
+    <p:spTree>
+      <p:nvGrpSpPr>
+        <p:cNvPr id="123" name="Shape 123"/>
+        <p:cNvGrpSpPr/>
+        <p:nvPr/>
+      </p:nvGrpSpPr>
+      <p:grpSpPr>
+        <a:xfrm>
+          <a:off x="0" y="0"/>
+          <a:ext cx="0" cy="0"/>
+          <a:chOff x="0" y="0"/>
+          <a:chExt cx="0" cy="0"/>
+        </a:xfrm>
+      </p:grpSpPr>
+      <p:sp>
+        <p:nvSpPr>
+          <p:cNvPr id="124" name="Google Shape;124;g2ea9fd44615_0_20:notes"/>
+          <p:cNvSpPr/>
+          <p:nvPr>
+            <p:ph idx="2" type="sldImg"/>
+          </p:nvPr>
+        </p:nvSpPr>
+        <p:spPr>
+          <a:xfrm>
+            <a:off x="381300" y="685800"/>
+            <a:ext cx="6096000" cy="3429000"/>
+          </a:xfrm>
+          <a:custGeom>
+            <a:rect b="b" l="l" r="r" t="t"/>
+            <a:pathLst>
+              <a:path extrusionOk="0" h="120000" w="120000">
+                <a:moveTo>
+                  <a:pt x="0" y="0"/>
+                </a:moveTo>
+                <a:lnTo>
+                  <a:pt x="120000" y="0"/>
+                </a:lnTo>
+                <a:lnTo>
+                  <a:pt x="120000" y="120000"/>
+                </a:lnTo>
+                <a:lnTo>
+                  <a:pt x="0" y="120000"/>
+                </a:lnTo>
+                <a:close/>
+              </a:path>
+            </a:pathLst>
+          </a:custGeom>
+        </p:spPr>
+      </p:sp>
+      <p:sp>
+        <p:nvSpPr>
+          <p:cNvPr id="125" name="Google Shape;125;g2ea9fd44615_0_20:notes"/>
+          <p:cNvSpPr txBox="1"/>
+          <p:nvPr>
+            <p:ph idx="1" type="body"/>
+          </p:nvPr>
+        </p:nvSpPr>
+        <p:spPr>
+          <a:xfrm>
+            <a:off x="685800" y="4343400"/>
+            <a:ext cx="5486400" cy="4114800"/>
+          </a:xfrm>
+          <a:prstGeom prst="rect">
+            <a:avLst/>
+          </a:prstGeom>
+        </p:spPr>
+        <p:txBody>
+          <a:bodyPr anchorCtr="0" anchor="t" bIns="91425" lIns="91425" spcFirstLastPara="1" rIns="91425" wrap="square" tIns="91425">
+            <a:noAutofit/>
+          </a:bodyPr>
+          <a:lstStyle/>
+          <a:p>
+            <a:pPr indent="0" lvl="0" marL="0" rtl="0" algn="l">
+              <a:spcBef>
+                <a:spcPts val="0"/>
+              </a:spcBef>
+              <a:spcAft>
+                <a:spcPts val="0"/>
+              </a:spcAft>
+              <a:buNone/>
+            </a:pPr>
+            <a:r>
+              <a:t/>
+            </a:r>
+            <a:endParaRPr/>
+          </a:p>
+        </p:txBody>
+      </p:sp>
+    </p:spTree>
+  </p:cSld>
+  <p:clrMapOvr>
+    <a:masterClrMapping/>
+  </p:clrMapOvr>
+</p:notes>
+</file>
+
+<file path=ppt/notesSlides/notesSlide14.xml><?xml version="1.0" encoding="utf-8"?>
+<p:notes xmlns:a="http://schemas.openxmlformats.org/drawingml/2006/main" xmlns:r="http://schemas.openxmlformats.org/officeDocument/2006/relationships" xmlns:mc="http://schemas.openxmlformats.org/markup-compatibility/2006" xmlns:mv="urn:schemas-microsoft-com:mac:vml" xmlns:p="http://schemas.openxmlformats.org/presentationml/2006/main" xmlns:c="http://schemas.openxmlformats.org/drawingml/2006/chart" xmlns:dgm="http://schemas.openxmlformats.org/drawingml/2006/diagram" xmlns:o="urn:schemas-microsoft-com:office:office" xmlns:v="urn:schemas-microsoft-com:vml" xmlns:pvml="urn:schemas-microsoft-com:office:powerpoint" xmlns:com="http://schemas.openxmlformats.org/drawingml/2006/compatibility" xmlns:p14="http://schemas.microsoft.com/office/powerpoint/2010/main" xmlns:p15="http://schemas.microsoft.com/office/powerpoint/2012/main" xmlns:ahyp="http://schemas.microsoft.com/office/drawing/2018/hyperlinkcolor" showMasterPhAnim="0" showMasterSp="0">
+  <p:cSld>
+    <p:spTree>
+      <p:nvGrpSpPr>
+        <p:cNvPr id="129" name="Shape 129"/>
+        <p:cNvGrpSpPr/>
+        <p:nvPr/>
+      </p:nvGrpSpPr>
+      <p:grpSpPr>
+        <a:xfrm>
+          <a:off x="0" y="0"/>
+          <a:ext cx="0" cy="0"/>
+          <a:chOff x="0" y="0"/>
+          <a:chExt cx="0" cy="0"/>
+        </a:xfrm>
+      </p:grpSpPr>
+      <p:sp>
+        <p:nvSpPr>
+          <p:cNvPr id="130" name="Google Shape;130;g2ea9fd44615_0_25:notes"/>
+          <p:cNvSpPr/>
+          <p:nvPr>
+            <p:ph idx="2" type="sldImg"/>
+          </p:nvPr>
+        </p:nvSpPr>
+        <p:spPr>
+          <a:xfrm>
+            <a:off x="381300" y="685800"/>
+            <a:ext cx="6096000" cy="3429000"/>
+          </a:xfrm>
+          <a:custGeom>
+            <a:rect b="b" l="l" r="r" t="t"/>
+            <a:pathLst>
+              <a:path extrusionOk="0" h="120000" w="120000">
+                <a:moveTo>
+                  <a:pt x="0" y="0"/>
+                </a:moveTo>
+                <a:lnTo>
+                  <a:pt x="120000" y="0"/>
+                </a:lnTo>
+                <a:lnTo>
+                  <a:pt x="120000" y="120000"/>
+                </a:lnTo>
+                <a:lnTo>
+                  <a:pt x="0" y="120000"/>
+                </a:lnTo>
+                <a:close/>
+              </a:path>
+            </a:pathLst>
+          </a:custGeom>
+        </p:spPr>
+      </p:sp>
+      <p:sp>
+        <p:nvSpPr>
+          <p:cNvPr id="131" name="Google Shape;131;g2ea9fd44615_0_25:notes"/>
           <p:cNvSpPr txBox="1"/>
           <p:nvPr>
             <p:ph idx="1" type="body"/>
@@ -7071,6 +7571,701 @@
 </p:sld>
 </file>
 
+<file path=ppt/slides/slide10.xml><?xml version="1.0" encoding="utf-8"?>
+<p:sld xmlns:a="http://schemas.openxmlformats.org/drawingml/2006/main" xmlns:r="http://schemas.openxmlformats.org/officeDocument/2006/relationships" xmlns:mc="http://schemas.openxmlformats.org/markup-compatibility/2006" xmlns:mv="urn:schemas-microsoft-com:mac:vml" xmlns:p="http://schemas.openxmlformats.org/presentationml/2006/main" xmlns:c="http://schemas.openxmlformats.org/drawingml/2006/chart" xmlns:dgm="http://schemas.openxmlformats.org/drawingml/2006/diagram" xmlns:o="urn:schemas-microsoft-com:office:office" xmlns:v="urn:schemas-microsoft-com:vml" xmlns:pvml="urn:schemas-microsoft-com:office:powerpoint" xmlns:com="http://schemas.openxmlformats.org/drawingml/2006/compatibility" xmlns:p14="http://schemas.microsoft.com/office/powerpoint/2010/main" xmlns:p15="http://schemas.microsoft.com/office/powerpoint/2012/main" xmlns:ahyp="http://schemas.microsoft.com/office/drawing/2018/hyperlinkcolor">
+  <p:cSld>
+    <p:spTree>
+      <p:nvGrpSpPr>
+        <p:cNvPr id="108" name="Shape 108"/>
+        <p:cNvGrpSpPr/>
+        <p:nvPr/>
+      </p:nvGrpSpPr>
+      <p:grpSpPr>
+        <a:xfrm>
+          <a:off x="0" y="0"/>
+          <a:ext cx="0" cy="0"/>
+          <a:chOff x="0" y="0"/>
+          <a:chExt cx="0" cy="0"/>
+        </a:xfrm>
+      </p:grpSpPr>
+      <p:pic>
+        <p:nvPicPr>
+          <p:cNvPr id="109" name="Google Shape;109;p22"/>
+          <p:cNvPicPr preferRelativeResize="0"/>
+          <p:nvPr/>
+        </p:nvPicPr>
+        <p:blipFill>
+          <a:blip r:embed="rId3">
+            <a:alphaModFix/>
+          </a:blip>
+          <a:stretch>
+            <a:fillRect/>
+          </a:stretch>
+        </p:blipFill>
+        <p:spPr>
+          <a:xfrm>
+            <a:off x="152400" y="0"/>
+            <a:ext cx="8518318" cy="5143499"/>
+          </a:xfrm>
+          <a:prstGeom prst="rect">
+            <a:avLst/>
+          </a:prstGeom>
+          <a:noFill/>
+          <a:ln>
+            <a:noFill/>
+          </a:ln>
+        </p:spPr>
+      </p:pic>
+      <p:sp>
+        <p:nvSpPr>
+          <p:cNvPr id="110" name="Google Shape;110;p22"/>
+          <p:cNvSpPr txBox="1"/>
+          <p:nvPr/>
+        </p:nvSpPr>
+        <p:spPr>
+          <a:xfrm>
+            <a:off x="5689275" y="4375675"/>
+            <a:ext cx="3173100" cy="461700"/>
+          </a:xfrm>
+          <a:prstGeom prst="rect">
+            <a:avLst/>
+          </a:prstGeom>
+          <a:noFill/>
+          <a:ln>
+            <a:noFill/>
+          </a:ln>
+        </p:spPr>
+        <p:txBody>
+          <a:bodyPr anchorCtr="0" anchor="t" bIns="91425" lIns="91425" spcFirstLastPara="1" rIns="91425" wrap="square" tIns="91425">
+            <a:spAutoFit/>
+          </a:bodyPr>
+          <a:lstStyle/>
+          <a:p>
+            <a:pPr indent="0" lvl="0" marL="0" rtl="0" algn="l">
+              <a:spcBef>
+                <a:spcPts val="0"/>
+              </a:spcBef>
+              <a:spcAft>
+                <a:spcPts val="0"/>
+              </a:spcAft>
+              <a:buNone/>
+            </a:pPr>
+            <a:r>
+              <a:rPr lang="en-GB" sz="1800">
+                <a:solidFill>
+                  <a:schemeClr val="dk2"/>
+                </a:solidFill>
+                <a:latin typeface="Source Code Pro"/>
+                <a:ea typeface="Source Code Pro"/>
+                <a:cs typeface="Source Code Pro"/>
+                <a:sym typeface="Source Code Pro"/>
+              </a:rPr>
+              <a:t>Create a sql server</a:t>
+            </a:r>
+            <a:endParaRPr sz="1800">
+              <a:solidFill>
+                <a:schemeClr val="dk2"/>
+              </a:solidFill>
+              <a:latin typeface="Source Code Pro"/>
+              <a:ea typeface="Source Code Pro"/>
+              <a:cs typeface="Source Code Pro"/>
+              <a:sym typeface="Source Code Pro"/>
+            </a:endParaRPr>
+          </a:p>
+        </p:txBody>
+      </p:sp>
+    </p:spTree>
+  </p:cSld>
+  <p:clrMapOvr>
+    <a:masterClrMapping/>
+  </p:clrMapOvr>
+</p:sld>
+</file>
+
+<file path=ppt/slides/slide11.xml><?xml version="1.0" encoding="utf-8"?>
+<p:sld xmlns:a="http://schemas.openxmlformats.org/drawingml/2006/main" xmlns:r="http://schemas.openxmlformats.org/officeDocument/2006/relationships" xmlns:mc="http://schemas.openxmlformats.org/markup-compatibility/2006" xmlns:mv="urn:schemas-microsoft-com:mac:vml" xmlns:p="http://schemas.openxmlformats.org/presentationml/2006/main" xmlns:c="http://schemas.openxmlformats.org/drawingml/2006/chart" xmlns:dgm="http://schemas.openxmlformats.org/drawingml/2006/diagram" xmlns:o="urn:schemas-microsoft-com:office:office" xmlns:v="urn:schemas-microsoft-com:vml" xmlns:pvml="urn:schemas-microsoft-com:office:powerpoint" xmlns:com="http://schemas.openxmlformats.org/drawingml/2006/compatibility" xmlns:p14="http://schemas.microsoft.com/office/powerpoint/2010/main" xmlns:p15="http://schemas.microsoft.com/office/powerpoint/2012/main" xmlns:ahyp="http://schemas.microsoft.com/office/drawing/2018/hyperlinkcolor">
+  <p:cSld>
+    <p:spTree>
+      <p:nvGrpSpPr>
+        <p:cNvPr id="114" name="Shape 114"/>
+        <p:cNvGrpSpPr/>
+        <p:nvPr/>
+      </p:nvGrpSpPr>
+      <p:grpSpPr>
+        <a:xfrm>
+          <a:off x="0" y="0"/>
+          <a:ext cx="0" cy="0"/>
+          <a:chOff x="0" y="0"/>
+          <a:chExt cx="0" cy="0"/>
+        </a:xfrm>
+      </p:grpSpPr>
+      <p:pic>
+        <p:nvPicPr>
+          <p:cNvPr id="115" name="Google Shape;115;p23"/>
+          <p:cNvPicPr preferRelativeResize="0"/>
+          <p:nvPr/>
+        </p:nvPicPr>
+        <p:blipFill>
+          <a:blip r:embed="rId3">
+            <a:alphaModFix/>
+          </a:blip>
+          <a:stretch>
+            <a:fillRect/>
+          </a:stretch>
+        </p:blipFill>
+        <p:spPr>
+          <a:xfrm>
+            <a:off x="261899" y="0"/>
+            <a:ext cx="8620211" cy="5143499"/>
+          </a:xfrm>
+          <a:prstGeom prst="rect">
+            <a:avLst/>
+          </a:prstGeom>
+          <a:noFill/>
+          <a:ln>
+            <a:noFill/>
+          </a:ln>
+        </p:spPr>
+      </p:pic>
+      <p:sp>
+        <p:nvSpPr>
+          <p:cNvPr id="116" name="Google Shape;116;p23"/>
+          <p:cNvSpPr txBox="1"/>
+          <p:nvPr/>
+        </p:nvSpPr>
+        <p:spPr>
+          <a:xfrm>
+            <a:off x="5939100" y="4014900"/>
+            <a:ext cx="2840100" cy="461700"/>
+          </a:xfrm>
+          <a:prstGeom prst="rect">
+            <a:avLst/>
+          </a:prstGeom>
+          <a:noFill/>
+          <a:ln>
+            <a:noFill/>
+          </a:ln>
+        </p:spPr>
+        <p:txBody>
+          <a:bodyPr anchorCtr="0" anchor="t" bIns="91425" lIns="91425" spcFirstLastPara="1" rIns="91425" wrap="square" tIns="91425">
+            <a:spAutoFit/>
+          </a:bodyPr>
+          <a:lstStyle/>
+          <a:p>
+            <a:pPr indent="0" lvl="0" marL="0" rtl="0" algn="l">
+              <a:spcBef>
+                <a:spcPts val="0"/>
+              </a:spcBef>
+              <a:spcAft>
+                <a:spcPts val="0"/>
+              </a:spcAft>
+              <a:buNone/>
+            </a:pPr>
+            <a:r>
+              <a:rPr lang="en-GB" sz="1800">
+                <a:solidFill>
+                  <a:schemeClr val="dk2"/>
+                </a:solidFill>
+                <a:latin typeface="Source Code Pro"/>
+                <a:ea typeface="Source Code Pro"/>
+                <a:cs typeface="Source Code Pro"/>
+                <a:sym typeface="Source Code Pro"/>
+              </a:rPr>
+              <a:t>Create a sql db</a:t>
+            </a:r>
+            <a:endParaRPr sz="1800">
+              <a:solidFill>
+                <a:schemeClr val="dk2"/>
+              </a:solidFill>
+              <a:latin typeface="Source Code Pro"/>
+              <a:ea typeface="Source Code Pro"/>
+              <a:cs typeface="Source Code Pro"/>
+              <a:sym typeface="Source Code Pro"/>
+            </a:endParaRPr>
+          </a:p>
+        </p:txBody>
+      </p:sp>
+    </p:spTree>
+  </p:cSld>
+  <p:clrMapOvr>
+    <a:masterClrMapping/>
+  </p:clrMapOvr>
+</p:sld>
+</file>
+
+<file path=ppt/slides/slide12.xml><?xml version="1.0" encoding="utf-8"?>
+<p:sld xmlns:a="http://schemas.openxmlformats.org/drawingml/2006/main" xmlns:r="http://schemas.openxmlformats.org/officeDocument/2006/relationships" xmlns:mc="http://schemas.openxmlformats.org/markup-compatibility/2006" xmlns:mv="urn:schemas-microsoft-com:mac:vml" xmlns:p="http://schemas.openxmlformats.org/presentationml/2006/main" xmlns:c="http://schemas.openxmlformats.org/drawingml/2006/chart" xmlns:dgm="http://schemas.openxmlformats.org/drawingml/2006/diagram" xmlns:o="urn:schemas-microsoft-com:office:office" xmlns:v="urn:schemas-microsoft-com:vml" xmlns:pvml="urn:schemas-microsoft-com:office:powerpoint" xmlns:com="http://schemas.openxmlformats.org/drawingml/2006/compatibility" xmlns:p14="http://schemas.microsoft.com/office/powerpoint/2010/main" xmlns:p15="http://schemas.microsoft.com/office/powerpoint/2012/main" xmlns:ahyp="http://schemas.microsoft.com/office/drawing/2018/hyperlinkcolor">
+  <p:cSld>
+    <p:spTree>
+      <p:nvGrpSpPr>
+        <p:cNvPr id="120" name="Shape 120"/>
+        <p:cNvGrpSpPr/>
+        <p:nvPr/>
+      </p:nvGrpSpPr>
+      <p:grpSpPr>
+        <a:xfrm>
+          <a:off x="0" y="0"/>
+          <a:ext cx="0" cy="0"/>
+          <a:chOff x="0" y="0"/>
+          <a:chExt cx="0" cy="0"/>
+        </a:xfrm>
+      </p:grpSpPr>
+      <p:pic>
+        <p:nvPicPr>
+          <p:cNvPr id="121" name="Google Shape;121;p24"/>
+          <p:cNvPicPr preferRelativeResize="0"/>
+          <p:nvPr/>
+        </p:nvPicPr>
+        <p:blipFill>
+          <a:blip r:embed="rId3">
+            <a:alphaModFix/>
+          </a:blip>
+          <a:stretch>
+            <a:fillRect/>
+          </a:stretch>
+        </p:blipFill>
+        <p:spPr>
+          <a:xfrm>
+            <a:off x="78400" y="0"/>
+            <a:ext cx="8535316" cy="5092850"/>
+          </a:xfrm>
+          <a:prstGeom prst="rect">
+            <a:avLst/>
+          </a:prstGeom>
+          <a:noFill/>
+          <a:ln>
+            <a:noFill/>
+          </a:ln>
+        </p:spPr>
+      </p:pic>
+      <p:sp>
+        <p:nvSpPr>
+          <p:cNvPr id="122" name="Google Shape;122;p24"/>
+          <p:cNvSpPr txBox="1"/>
+          <p:nvPr/>
+        </p:nvSpPr>
+        <p:spPr>
+          <a:xfrm>
+            <a:off x="5754050" y="4505200"/>
+            <a:ext cx="3404400" cy="461700"/>
+          </a:xfrm>
+          <a:prstGeom prst="rect">
+            <a:avLst/>
+          </a:prstGeom>
+          <a:noFill/>
+          <a:ln>
+            <a:noFill/>
+          </a:ln>
+        </p:spPr>
+        <p:txBody>
+          <a:bodyPr anchorCtr="0" anchor="t" bIns="91425" lIns="91425" spcFirstLastPara="1" rIns="91425" wrap="square" tIns="91425">
+            <a:spAutoFit/>
+          </a:bodyPr>
+          <a:lstStyle/>
+          <a:p>
+            <a:pPr indent="0" lvl="0" marL="0" rtl="0" algn="l">
+              <a:spcBef>
+                <a:spcPts val="0"/>
+              </a:spcBef>
+              <a:spcAft>
+                <a:spcPts val="0"/>
+              </a:spcAft>
+              <a:buNone/>
+            </a:pPr>
+            <a:r>
+              <a:rPr lang="en-GB" sz="1800">
+                <a:solidFill>
+                  <a:schemeClr val="dk2"/>
+                </a:solidFill>
+                <a:latin typeface="Source Code Pro"/>
+                <a:ea typeface="Source Code Pro"/>
+                <a:cs typeface="Source Code Pro"/>
+                <a:sym typeface="Source Code Pro"/>
+              </a:rPr>
+              <a:t>Final setup</a:t>
+            </a:r>
+            <a:endParaRPr sz="1800">
+              <a:solidFill>
+                <a:schemeClr val="dk2"/>
+              </a:solidFill>
+              <a:latin typeface="Source Code Pro"/>
+              <a:ea typeface="Source Code Pro"/>
+              <a:cs typeface="Source Code Pro"/>
+              <a:sym typeface="Source Code Pro"/>
+            </a:endParaRPr>
+          </a:p>
+        </p:txBody>
+      </p:sp>
+    </p:spTree>
+  </p:cSld>
+  <p:clrMapOvr>
+    <a:masterClrMapping/>
+  </p:clrMapOvr>
+</p:sld>
+</file>
+
+<file path=ppt/slides/slide13.xml><?xml version="1.0" encoding="utf-8"?>
+<p:sld xmlns:a="http://schemas.openxmlformats.org/drawingml/2006/main" xmlns:r="http://schemas.openxmlformats.org/officeDocument/2006/relationships" xmlns:mc="http://schemas.openxmlformats.org/markup-compatibility/2006" xmlns:mv="urn:schemas-microsoft-com:mac:vml" xmlns:p="http://schemas.openxmlformats.org/presentationml/2006/main" xmlns:c="http://schemas.openxmlformats.org/drawingml/2006/chart" xmlns:dgm="http://schemas.openxmlformats.org/drawingml/2006/diagram" xmlns:o="urn:schemas-microsoft-com:office:office" xmlns:v="urn:schemas-microsoft-com:vml" xmlns:pvml="urn:schemas-microsoft-com:office:powerpoint" xmlns:com="http://schemas.openxmlformats.org/drawingml/2006/compatibility" xmlns:p14="http://schemas.microsoft.com/office/powerpoint/2010/main" xmlns:p15="http://schemas.microsoft.com/office/powerpoint/2012/main" xmlns:ahyp="http://schemas.microsoft.com/office/drawing/2018/hyperlinkcolor">
+  <p:cSld>
+    <p:spTree>
+      <p:nvGrpSpPr>
+        <p:cNvPr id="126" name="Shape 126"/>
+        <p:cNvGrpSpPr/>
+        <p:nvPr/>
+      </p:nvGrpSpPr>
+      <p:grpSpPr>
+        <a:xfrm>
+          <a:off x="0" y="0"/>
+          <a:ext cx="0" cy="0"/>
+          <a:chOff x="0" y="0"/>
+          <a:chExt cx="0" cy="0"/>
+        </a:xfrm>
+      </p:grpSpPr>
+      <p:pic>
+        <p:nvPicPr>
+          <p:cNvPr id="127" name="Google Shape;127;p25"/>
+          <p:cNvPicPr preferRelativeResize="0"/>
+          <p:nvPr/>
+        </p:nvPicPr>
+        <p:blipFill>
+          <a:blip r:embed="rId3">
+            <a:alphaModFix/>
+          </a:blip>
+          <a:stretch>
+            <a:fillRect/>
+          </a:stretch>
+        </p:blipFill>
+        <p:spPr>
+          <a:xfrm>
+            <a:off x="152400" y="846225"/>
+            <a:ext cx="8839199" cy="2862217"/>
+          </a:xfrm>
+          <a:prstGeom prst="rect">
+            <a:avLst/>
+          </a:prstGeom>
+          <a:noFill/>
+          <a:ln>
+            <a:noFill/>
+          </a:ln>
+        </p:spPr>
+      </p:pic>
+      <p:sp>
+        <p:nvSpPr>
+          <p:cNvPr id="128" name="Google Shape;128;p25"/>
+          <p:cNvSpPr txBox="1"/>
+          <p:nvPr/>
+        </p:nvSpPr>
+        <p:spPr>
+          <a:xfrm>
+            <a:off x="1498650" y="4024150"/>
+            <a:ext cx="5328600" cy="738900"/>
+          </a:xfrm>
+          <a:prstGeom prst="rect">
+            <a:avLst/>
+          </a:prstGeom>
+          <a:noFill/>
+          <a:ln>
+            <a:noFill/>
+          </a:ln>
+        </p:spPr>
+        <p:txBody>
+          <a:bodyPr anchorCtr="0" anchor="t" bIns="91425" lIns="91425" spcFirstLastPara="1" rIns="91425" wrap="square" tIns="91425">
+            <a:spAutoFit/>
+          </a:bodyPr>
+          <a:lstStyle/>
+          <a:p>
+            <a:pPr indent="0" lvl="0" marL="0" rtl="0" algn="l">
+              <a:spcBef>
+                <a:spcPts val="0"/>
+              </a:spcBef>
+              <a:spcAft>
+                <a:spcPts val="0"/>
+              </a:spcAft>
+              <a:buNone/>
+            </a:pPr>
+            <a:r>
+              <a:rPr lang="en-GB" sz="1800">
+                <a:solidFill>
+                  <a:schemeClr val="dk2"/>
+                </a:solidFill>
+                <a:latin typeface="Source Code Pro"/>
+                <a:ea typeface="Source Code Pro"/>
+                <a:cs typeface="Source Code Pro"/>
+                <a:sym typeface="Source Code Pro"/>
+              </a:rPr>
+              <a:t>Edit the sql server for subnet 2</a:t>
+            </a:r>
+            <a:endParaRPr sz="1800">
+              <a:solidFill>
+                <a:schemeClr val="dk2"/>
+              </a:solidFill>
+              <a:latin typeface="Source Code Pro"/>
+              <a:ea typeface="Source Code Pro"/>
+              <a:cs typeface="Source Code Pro"/>
+              <a:sym typeface="Source Code Pro"/>
+            </a:endParaRPr>
+          </a:p>
+          <a:p>
+            <a:pPr indent="0" lvl="0" marL="0" rtl="0" algn="l">
+              <a:spcBef>
+                <a:spcPts val="0"/>
+              </a:spcBef>
+              <a:spcAft>
+                <a:spcPts val="0"/>
+              </a:spcAft>
+              <a:buNone/>
+            </a:pPr>
+            <a:r>
+              <a:rPr lang="en-GB" sz="1800">
+                <a:solidFill>
+                  <a:schemeClr val="dk2"/>
+                </a:solidFill>
+                <a:latin typeface="Source Code Pro"/>
+                <a:ea typeface="Source Code Pro"/>
+                <a:cs typeface="Source Code Pro"/>
+                <a:sym typeface="Source Code Pro"/>
+              </a:rPr>
+              <a:t>And your done</a:t>
+            </a:r>
+            <a:endParaRPr sz="1800">
+              <a:solidFill>
+                <a:schemeClr val="dk2"/>
+              </a:solidFill>
+              <a:latin typeface="Source Code Pro"/>
+              <a:ea typeface="Source Code Pro"/>
+              <a:cs typeface="Source Code Pro"/>
+              <a:sym typeface="Source Code Pro"/>
+            </a:endParaRPr>
+          </a:p>
+        </p:txBody>
+      </p:sp>
+    </p:spTree>
+  </p:cSld>
+  <p:clrMapOvr>
+    <a:masterClrMapping/>
+  </p:clrMapOvr>
+</p:sld>
+</file>
+
+<file path=ppt/slides/slide14.xml><?xml version="1.0" encoding="utf-8"?>
+<p:sld xmlns:a="http://schemas.openxmlformats.org/drawingml/2006/main" xmlns:r="http://schemas.openxmlformats.org/officeDocument/2006/relationships" xmlns:mc="http://schemas.openxmlformats.org/markup-compatibility/2006" xmlns:mv="urn:schemas-microsoft-com:mac:vml" xmlns:p="http://schemas.openxmlformats.org/presentationml/2006/main" xmlns:c="http://schemas.openxmlformats.org/drawingml/2006/chart" xmlns:dgm="http://schemas.openxmlformats.org/drawingml/2006/diagram" xmlns:o="urn:schemas-microsoft-com:office:office" xmlns:v="urn:schemas-microsoft-com:vml" xmlns:pvml="urn:schemas-microsoft-com:office:powerpoint" xmlns:com="http://schemas.openxmlformats.org/drawingml/2006/compatibility" xmlns:p14="http://schemas.microsoft.com/office/powerpoint/2010/main" xmlns:p15="http://schemas.microsoft.com/office/powerpoint/2012/main" xmlns:ahyp="http://schemas.microsoft.com/office/drawing/2018/hyperlinkcolor">
+  <p:cSld>
+    <p:spTree>
+      <p:nvGrpSpPr>
+        <p:cNvPr id="132" name="Shape 132"/>
+        <p:cNvGrpSpPr/>
+        <p:nvPr/>
+      </p:nvGrpSpPr>
+      <p:grpSpPr>
+        <a:xfrm>
+          <a:off x="0" y="0"/>
+          <a:ext cx="0" cy="0"/>
+          <a:chOff x="0" y="0"/>
+          <a:chExt cx="0" cy="0"/>
+        </a:xfrm>
+      </p:grpSpPr>
+      <p:sp>
+        <p:nvSpPr>
+          <p:cNvPr id="133" name="Google Shape;133;p26"/>
+          <p:cNvSpPr txBox="1"/>
+          <p:nvPr>
+            <p:ph type="title"/>
+          </p:nvPr>
+        </p:nvSpPr>
+        <p:spPr>
+          <a:xfrm>
+            <a:off x="490250" y="526350"/>
+            <a:ext cx="6198300" cy="4090800"/>
+          </a:xfrm>
+          <a:prstGeom prst="rect">
+            <a:avLst/>
+          </a:prstGeom>
+          <a:effectLst>
+            <a:outerShdw blurRad="57150" rotWithShape="0" algn="bl" dist="28575">
+              <a:srgbClr val="000000">
+                <a:alpha val="50000"/>
+              </a:srgbClr>
+            </a:outerShdw>
+          </a:effectLst>
+        </p:spPr>
+        <p:txBody>
+          <a:bodyPr anchorCtr="0" anchor="ctr" bIns="91425" lIns="91425" spcFirstLastPara="1" rIns="91425" wrap="square" tIns="91425">
+            <a:normAutofit/>
+          </a:bodyPr>
+          <a:lstStyle/>
+          <a:p>
+            <a:pPr indent="-381000" lvl="0" marL="457200" rtl="0" algn="l">
+              <a:spcBef>
+                <a:spcPts val="0"/>
+              </a:spcBef>
+              <a:spcAft>
+                <a:spcPts val="0"/>
+              </a:spcAft>
+              <a:buSzPts val="2400"/>
+              <a:buChar char="●"/>
+            </a:pPr>
+            <a:r>
+              <a:rPr lang="en-GB" sz="2400"/>
+              <a:t>Did many things here </a:t>
+            </a:r>
+            <a:endParaRPr sz="2400"/>
+          </a:p>
+          <a:p>
+            <a:pPr indent="-381000" lvl="0" marL="457200" rtl="0" algn="l">
+              <a:spcBef>
+                <a:spcPts val="0"/>
+              </a:spcBef>
+              <a:spcAft>
+                <a:spcPts val="0"/>
+              </a:spcAft>
+              <a:buSzPts val="2400"/>
+              <a:buChar char="●"/>
+            </a:pPr>
+            <a:r>
+              <a:rPr lang="en-GB" sz="2400"/>
+              <a:t>Created two </a:t>
+            </a:r>
+            <a:r>
+              <a:rPr lang="en-GB" sz="2400"/>
+              <a:t>virtual</a:t>
+            </a:r>
+            <a:r>
+              <a:rPr lang="en-GB" sz="2400"/>
+              <a:t> </a:t>
+            </a:r>
+            <a:r>
+              <a:rPr lang="en-GB" sz="2400"/>
+              <a:t>machine</a:t>
+            </a:r>
+            <a:endParaRPr sz="2400"/>
+          </a:p>
+          <a:p>
+            <a:pPr indent="-381000" lvl="0" marL="457200" rtl="0" algn="l">
+              <a:spcBef>
+                <a:spcPts val="0"/>
+              </a:spcBef>
+              <a:spcAft>
+                <a:spcPts val="0"/>
+              </a:spcAft>
+              <a:buSzPts val="2400"/>
+              <a:buChar char="●"/>
+            </a:pPr>
+            <a:r>
+              <a:rPr lang="en-GB" sz="2400"/>
+              <a:t>Created a db</a:t>
+            </a:r>
+            <a:endParaRPr sz="2400"/>
+          </a:p>
+          <a:p>
+            <a:pPr indent="-381000" lvl="0" marL="457200" rtl="0" algn="l">
+              <a:spcBef>
+                <a:spcPts val="0"/>
+              </a:spcBef>
+              <a:spcAft>
+                <a:spcPts val="0"/>
+              </a:spcAft>
+              <a:buSzPts val="2400"/>
+              <a:buChar char="●"/>
+            </a:pPr>
+            <a:r>
+              <a:rPr lang="en-GB" sz="2400"/>
+              <a:t>Connected the vms to subnet 1</a:t>
+            </a:r>
+            <a:endParaRPr sz="2400"/>
+          </a:p>
+          <a:p>
+            <a:pPr indent="-381000" lvl="0" marL="457200" rtl="0" algn="l">
+              <a:spcBef>
+                <a:spcPts val="0"/>
+              </a:spcBef>
+              <a:spcAft>
+                <a:spcPts val="0"/>
+              </a:spcAft>
+              <a:buSzPts val="2400"/>
+              <a:buChar char="●"/>
+            </a:pPr>
+            <a:r>
+              <a:rPr lang="en-GB" sz="2400"/>
+              <a:t>Connected the sql server to subnet 2</a:t>
+            </a:r>
+            <a:endParaRPr sz="2400"/>
+          </a:p>
+          <a:p>
+            <a:pPr indent="-381000" lvl="0" marL="457200" rtl="0" algn="l">
+              <a:spcBef>
+                <a:spcPts val="0"/>
+              </a:spcBef>
+              <a:spcAft>
+                <a:spcPts val="0"/>
+              </a:spcAft>
+              <a:buSzPts val="2400"/>
+              <a:buChar char="●"/>
+            </a:pPr>
+            <a:r>
+              <a:rPr lang="en-GB" sz="2400"/>
+              <a:t>Hooray !! end of job </a:t>
+            </a:r>
+            <a:endParaRPr sz="2400"/>
+          </a:p>
+          <a:p>
+            <a:pPr indent="0" lvl="0" marL="457200" rtl="0" algn="l">
+              <a:spcBef>
+                <a:spcPts val="0"/>
+              </a:spcBef>
+              <a:spcAft>
+                <a:spcPts val="0"/>
+              </a:spcAft>
+              <a:buNone/>
+            </a:pPr>
+            <a:r>
+              <a:t/>
+            </a:r>
+            <a:endParaRPr sz="2400"/>
+          </a:p>
+          <a:p>
+            <a:pPr indent="-381000" lvl="0" marL="457200" rtl="0" algn="l">
+              <a:spcBef>
+                <a:spcPts val="0"/>
+              </a:spcBef>
+              <a:spcAft>
+                <a:spcPts val="0"/>
+              </a:spcAft>
+              <a:buClr>
+                <a:schemeClr val="accent1"/>
+              </a:buClr>
+              <a:buSzPts val="2400"/>
+              <a:buChar char="●"/>
+            </a:pPr>
+            <a:r>
+              <a:rPr lang="en-GB" sz="2400">
+                <a:solidFill>
+                  <a:schemeClr val="accent1"/>
+                </a:solidFill>
+                <a:highlight>
+                  <a:srgbClr val="FFFF00"/>
+                </a:highlight>
+              </a:rPr>
+              <a:t>Also in git there is the cli file for doing it in a instant</a:t>
+            </a:r>
+            <a:endParaRPr sz="2400">
+              <a:solidFill>
+                <a:schemeClr val="accent1"/>
+              </a:solidFill>
+              <a:highlight>
+                <a:srgbClr val="FFFF00"/>
+              </a:highlight>
+            </a:endParaRPr>
+          </a:p>
+        </p:txBody>
+      </p:sp>
+    </p:spTree>
+  </p:cSld>
+  <p:clrMapOvr>
+    <a:masterClrMapping/>
+  </p:clrMapOvr>
+</p:sld>
+</file>
+
 <file path=ppt/slides/slide2.xml><?xml version="1.0" encoding="utf-8"?>
 <p:sld xmlns:a="http://schemas.openxmlformats.org/drawingml/2006/main" xmlns:r="http://schemas.openxmlformats.org/officeDocument/2006/relationships" xmlns:mc="http://schemas.openxmlformats.org/markup-compatibility/2006" xmlns:mv="urn:schemas-microsoft-com:mac:vml" xmlns:p="http://schemas.openxmlformats.org/presentationml/2006/main" xmlns:c="http://schemas.openxmlformats.org/drawingml/2006/chart" xmlns:dgm="http://schemas.openxmlformats.org/drawingml/2006/diagram" xmlns:o="urn:schemas-microsoft-com:office:office" xmlns:v="urn:schemas-microsoft-com:vml" xmlns:pvml="urn:schemas-microsoft-com:office:powerpoint" xmlns:com="http://schemas.openxmlformats.org/drawingml/2006/compatibility" xmlns:p14="http://schemas.microsoft.com/office/powerpoint/2010/main" xmlns:p15="http://schemas.microsoft.com/office/powerpoint/2012/main" xmlns:ahyp="http://schemas.microsoft.com/office/drawing/2018/hyperlinkcolor">
   <p:cSld>
@@ -7967,6 +9162,285 @@
 </file>
 
 <file path=ppt/theme/theme1.xml><?xml version="1.0" encoding="utf-8"?>
+<a:theme xmlns:a="http://schemas.openxmlformats.org/drawingml/2006/main" xmlns:r="http://schemas.openxmlformats.org/officeDocument/2006/relationships" name="Beach Day">
+  <a:themeElements>
+    <a:clrScheme name="Beach Day">
+      <a:dk1>
+        <a:srgbClr val="00FDC8"/>
+      </a:dk1>
+      <a:lt1>
+        <a:srgbClr val="FFFFFF"/>
+      </a:lt1>
+      <a:dk2>
+        <a:srgbClr val="666666"/>
+      </a:dk2>
+      <a:lt2>
+        <a:srgbClr val="EEEEEE"/>
+      </a:lt2>
+      <a:accent1>
+        <a:srgbClr val="212121"/>
+      </a:accent1>
+      <a:accent2>
+        <a:srgbClr val="455A64"/>
+      </a:accent2>
+      <a:accent3>
+        <a:srgbClr val="78909C"/>
+      </a:accent3>
+      <a:accent4>
+        <a:srgbClr val="7C7CE0"/>
+      </a:accent4>
+      <a:accent5>
+        <a:srgbClr val="DB4437"/>
+      </a:accent5>
+      <a:accent6>
+        <a:srgbClr val="F6CD4C"/>
+      </a:accent6>
+      <a:hlink>
+        <a:srgbClr val="DB4437"/>
+      </a:hlink>
+      <a:folHlink>
+        <a:srgbClr val="DB4437"/>
+      </a:folHlink>
+    </a:clrScheme>
+    <a:fontScheme name="Office">
+      <a:majorFont>
+        <a:latin typeface="Arial"/>
+        <a:ea typeface=""/>
+        <a:cs typeface=""/>
+        <a:font script="Jpan" typeface="ＭＳ Ｐゴシック"/>
+        <a:font script="Hang" typeface="맑은 고딕"/>
+        <a:font script="Hans" typeface="宋体"/>
+        <a:font script="Hant" typeface="新細明體"/>
+        <a:font script="Arab" typeface="Times New Roman"/>
+        <a:font script="Hebr" typeface="Times New Roman"/>
+        <a:font script="Thai" typeface="Angsana New"/>
+        <a:font script="Ethi" typeface="Nyala"/>
+        <a:font script="Beng" typeface="Vrinda"/>
+        <a:font script="Gujr" typeface="Shruti"/>
+        <a:font script="Khmr" typeface="MoolBoran"/>
+        <a:font script="Knda" typeface="Tunga"/>
+        <a:font script="Guru" typeface="Raavi"/>
+        <a:font script="Cans" typeface="Euphemia"/>
+        <a:font script="Cher" typeface="Plantagenet Cherokee"/>
+        <a:font script="Yiii" typeface="Microsoft Yi Baiti"/>
+        <a:font script="Tibt" typeface="Microsoft Himalaya"/>
+        <a:font script="Thaa" typeface="MV Boli"/>
+        <a:font script="Deva" typeface="Mangal"/>
+        <a:font script="Telu" typeface="Gautami"/>
+        <a:font script="Taml" typeface="Latha"/>
+        <a:font script="Syrc" typeface="Estrangelo Edessa"/>
+        <a:font script="Orya" typeface="Kalinga"/>
+        <a:font script="Mlym" typeface="Kartika"/>
+        <a:font script="Laoo" typeface="DokChampa"/>
+        <a:font script="Sinh" typeface="Iskoola Pota"/>
+        <a:font script="Mong" typeface="Mongolian Baiti"/>
+        <a:font script="Viet" typeface="Times New Roman"/>
+        <a:font script="Uigh" typeface="Microsoft Uighur"/>
+        <a:font script="Geor" typeface="Sylfaen"/>
+      </a:majorFont>
+      <a:minorFont>
+        <a:latin typeface="Arial"/>
+        <a:ea typeface=""/>
+        <a:cs typeface=""/>
+        <a:font script="Jpan" typeface="ＭＳ Ｐゴシック"/>
+        <a:font script="Hang" typeface="맑은 고딕"/>
+        <a:font script="Hans" typeface="宋体"/>
+        <a:font script="Hant" typeface="新細明體"/>
+        <a:font script="Arab" typeface="Arial"/>
+        <a:font script="Hebr" typeface="Arial"/>
+        <a:font script="Thai" typeface="Cordia New"/>
+        <a:font script="Ethi" typeface="Nyala"/>
+        <a:font script="Beng" typeface="Vrinda"/>
+        <a:font script="Gujr" typeface="Shruti"/>
+        <a:font script="Khmr" typeface="DaunPenh"/>
+        <a:font script="Knda" typeface="Tunga"/>
+        <a:font script="Guru" typeface="Raavi"/>
+        <a:font script="Cans" typeface="Euphemia"/>
+        <a:font script="Cher" typeface="Plantagenet Cherokee"/>
+        <a:font script="Yiii" typeface="Microsoft Yi Baiti"/>
+        <a:font script="Tibt" typeface="Microsoft Himalaya"/>
+        <a:font script="Thaa" typeface="MV Boli"/>
+        <a:font script="Deva" typeface="Mangal"/>
+        <a:font script="Telu" typeface="Gautami"/>
+        <a:font script="Taml" typeface="Latha"/>
+        <a:font script="Syrc" typeface="Estrangelo Edessa"/>
+        <a:font script="Orya" typeface="Kalinga"/>
+        <a:font script="Mlym" typeface="Kartika"/>
+        <a:font script="Laoo" typeface="DokChampa"/>
+        <a:font script="Sinh" typeface="Iskoola Pota"/>
+        <a:font script="Mong" typeface="Mongolian Baiti"/>
+        <a:font script="Viet" typeface="Arial"/>
+        <a:font script="Uigh" typeface="Microsoft Uighur"/>
+        <a:font script="Geor" typeface="Sylfaen"/>
+      </a:minorFont>
+    </a:fontScheme>
+    <a:fmtScheme name="Office">
+      <a:fillStyleLst>
+        <a:solidFill>
+          <a:schemeClr val="phClr"/>
+        </a:solidFill>
+        <a:gradFill rotWithShape="1">
+          <a:gsLst>
+            <a:gs pos="0">
+              <a:schemeClr val="phClr">
+                <a:tint val="50000"/>
+                <a:satMod val="300000"/>
+              </a:schemeClr>
+            </a:gs>
+            <a:gs pos="35000">
+              <a:schemeClr val="phClr">
+                <a:tint val="37000"/>
+                <a:satMod val="300000"/>
+              </a:schemeClr>
+            </a:gs>
+            <a:gs pos="100000">
+              <a:schemeClr val="phClr">
+                <a:tint val="15000"/>
+                <a:satMod val="350000"/>
+              </a:schemeClr>
+            </a:gs>
+          </a:gsLst>
+          <a:lin ang="16200000" scaled="1"/>
+        </a:gradFill>
+        <a:gradFill rotWithShape="1">
+          <a:gsLst>
+            <a:gs pos="0">
+              <a:schemeClr val="phClr">
+                <a:tint val="100000"/>
+                <a:shade val="100000"/>
+                <a:satMod val="130000"/>
+              </a:schemeClr>
+            </a:gs>
+            <a:gs pos="100000">
+              <a:schemeClr val="phClr">
+                <a:tint val="50000"/>
+                <a:shade val="100000"/>
+                <a:satMod val="350000"/>
+              </a:schemeClr>
+            </a:gs>
+          </a:gsLst>
+          <a:lin ang="16200000" scaled="0"/>
+        </a:gradFill>
+      </a:fillStyleLst>
+      <a:lnStyleLst>
+        <a:ln w="9525" cap="flat" cmpd="sng" algn="ctr">
+          <a:solidFill>
+            <a:schemeClr val="phClr">
+              <a:shade val="95000"/>
+              <a:satMod val="105000"/>
+            </a:schemeClr>
+          </a:solidFill>
+          <a:prstDash val="solid"/>
+        </a:ln>
+        <a:ln w="25400" cap="flat" cmpd="sng" algn="ctr">
+          <a:solidFill>
+            <a:schemeClr val="phClr"/>
+          </a:solidFill>
+          <a:prstDash val="solid"/>
+        </a:ln>
+        <a:ln w="38100" cap="flat" cmpd="sng" algn="ctr">
+          <a:solidFill>
+            <a:schemeClr val="phClr"/>
+          </a:solidFill>
+          <a:prstDash val="solid"/>
+        </a:ln>
+      </a:lnStyleLst>
+      <a:effectStyleLst>
+        <a:effectStyle>
+          <a:effectLst>
+            <a:outerShdw blurRad="40000" dist="20000" dir="5400000" rotWithShape="0">
+              <a:srgbClr val="000000">
+                <a:alpha val="38000"/>
+              </a:srgbClr>
+            </a:outerShdw>
+          </a:effectLst>
+        </a:effectStyle>
+        <a:effectStyle>
+          <a:effectLst>
+            <a:outerShdw blurRad="40000" dist="23000" dir="5400000" rotWithShape="0">
+              <a:srgbClr val="000000">
+                <a:alpha val="35000"/>
+              </a:srgbClr>
+            </a:outerShdw>
+          </a:effectLst>
+        </a:effectStyle>
+        <a:effectStyle>
+          <a:effectLst>
+            <a:outerShdw blurRad="40000" dist="23000" dir="5400000" rotWithShape="0">
+              <a:srgbClr val="000000">
+                <a:alpha val="35000"/>
+              </a:srgbClr>
+            </a:outerShdw>
+          </a:effectLst>
+          <a:scene3d>
+            <a:camera prst="orthographicFront">
+              <a:rot lat="0" lon="0" rev="0"/>
+            </a:camera>
+            <a:lightRig rig="threePt" dir="t">
+              <a:rot lat="0" lon="0" rev="1200000"/>
+            </a:lightRig>
+          </a:scene3d>
+          <a:sp3d>
+            <a:bevelT w="63500" h="25400"/>
+          </a:sp3d>
+        </a:effectStyle>
+      </a:effectStyleLst>
+      <a:bgFillStyleLst>
+        <a:solidFill>
+          <a:schemeClr val="phClr"/>
+        </a:solidFill>
+        <a:gradFill rotWithShape="1">
+          <a:gsLst>
+            <a:gs pos="0">
+              <a:schemeClr val="phClr">
+                <a:tint val="40000"/>
+                <a:satMod val="350000"/>
+              </a:schemeClr>
+            </a:gs>
+            <a:gs pos="40000">
+              <a:schemeClr val="phClr">
+                <a:tint val="45000"/>
+                <a:shade val="99000"/>
+                <a:satMod val="350000"/>
+              </a:schemeClr>
+            </a:gs>
+            <a:gs pos="100000">
+              <a:schemeClr val="phClr">
+                <a:shade val="20000"/>
+                <a:satMod val="255000"/>
+              </a:schemeClr>
+            </a:gs>
+          </a:gsLst>
+          <a:path path="circle">
+            <a:fillToRect l="50000" t="-80000" r="50000" b="180000"/>
+          </a:path>
+        </a:gradFill>
+        <a:gradFill rotWithShape="1">
+          <a:gsLst>
+            <a:gs pos="0">
+              <a:schemeClr val="phClr">
+                <a:tint val="80000"/>
+                <a:satMod val="300000"/>
+              </a:schemeClr>
+            </a:gs>
+            <a:gs pos="100000">
+              <a:schemeClr val="phClr">
+                <a:shade val="30000"/>
+                <a:satMod val="200000"/>
+              </a:schemeClr>
+            </a:gs>
+          </a:gsLst>
+          <a:path path="circle">
+            <a:fillToRect l="50000" t="50000" r="50000" b="50000"/>
+          </a:path>
+        </a:gradFill>
+      </a:bgFillStyleLst>
+    </a:fmtScheme>
+  </a:themeElements>
+</a:theme>
+</file>
+
+<file path=ppt/theme/theme2.xml><?xml version="1.0" encoding="utf-8"?>
 <a:theme xmlns:a="http://schemas.openxmlformats.org/drawingml/2006/main" xmlns:r="http://schemas.openxmlformats.org/officeDocument/2006/relationships">
   <a:themeElements>
     <a:clrScheme name="Default">
@@ -8243,283 +9717,4 @@
     </a:fmtScheme>
   </a:themeElements>
 </a:theme>
-</file>
-
-<file path=ppt/theme/theme2.xml><?xml version="1.0" encoding="utf-8"?>
-<a:theme xmlns:a="http://schemas.openxmlformats.org/drawingml/2006/main" xmlns:r="http://schemas.openxmlformats.org/officeDocument/2006/relationships" name="Beach Day">
-  <a:themeElements>
-    <a:clrScheme name="Beach Day">
-      <a:dk1>
-        <a:srgbClr val="00FDC8"/>
-      </a:dk1>
-      <a:lt1>
-        <a:srgbClr val="FFFFFF"/>
-      </a:lt1>
-      <a:dk2>
-        <a:srgbClr val="666666"/>
-      </a:dk2>
-      <a:lt2>
-        <a:srgbClr val="EEEEEE"/>
-      </a:lt2>
-      <a:accent1>
-        <a:srgbClr val="212121"/>
-      </a:accent1>
-      <a:accent2>
-        <a:srgbClr val="455A64"/>
-      </a:accent2>
-      <a:accent3>
-        <a:srgbClr val="78909C"/>
-      </a:accent3>
-      <a:accent4>
-        <a:srgbClr val="7C7CE0"/>
-      </a:accent4>
-      <a:accent5>
-        <a:srgbClr val="DB4437"/>
-      </a:accent5>
-      <a:accent6>
-        <a:srgbClr val="F6CD4C"/>
-      </a:accent6>
-      <a:hlink>
-        <a:srgbClr val="DB4437"/>
-      </a:hlink>
-      <a:folHlink>
-        <a:srgbClr val="DB4437"/>
-      </a:folHlink>
-    </a:clrScheme>
-    <a:fontScheme name="Office">
-      <a:majorFont>
-        <a:latin typeface="Arial"/>
-        <a:ea typeface=""/>
-        <a:cs typeface=""/>
-        <a:font script="Jpan" typeface="ＭＳ Ｐゴシック"/>
-        <a:font script="Hang" typeface="맑은 고딕"/>
-        <a:font script="Hans" typeface="宋体"/>
-        <a:font script="Hant" typeface="新細明體"/>
-        <a:font script="Arab" typeface="Times New Roman"/>
-        <a:font script="Hebr" typeface="Times New Roman"/>
-        <a:font script="Thai" typeface="Angsana New"/>
-        <a:font script="Ethi" typeface="Nyala"/>
-        <a:font script="Beng" typeface="Vrinda"/>
-        <a:font script="Gujr" typeface="Shruti"/>
-        <a:font script="Khmr" typeface="MoolBoran"/>
-        <a:font script="Knda" typeface="Tunga"/>
-        <a:font script="Guru" typeface="Raavi"/>
-        <a:font script="Cans" typeface="Euphemia"/>
-        <a:font script="Cher" typeface="Plantagenet Cherokee"/>
-        <a:font script="Yiii" typeface="Microsoft Yi Baiti"/>
-        <a:font script="Tibt" typeface="Microsoft Himalaya"/>
-        <a:font script="Thaa" typeface="MV Boli"/>
-        <a:font script="Deva" typeface="Mangal"/>
-        <a:font script="Telu" typeface="Gautami"/>
-        <a:font script="Taml" typeface="Latha"/>
-        <a:font script="Syrc" typeface="Estrangelo Edessa"/>
-        <a:font script="Orya" typeface="Kalinga"/>
-        <a:font script="Mlym" typeface="Kartika"/>
-        <a:font script="Laoo" typeface="DokChampa"/>
-        <a:font script="Sinh" typeface="Iskoola Pota"/>
-        <a:font script="Mong" typeface="Mongolian Baiti"/>
-        <a:font script="Viet" typeface="Times New Roman"/>
-        <a:font script="Uigh" typeface="Microsoft Uighur"/>
-        <a:font script="Geor" typeface="Sylfaen"/>
-      </a:majorFont>
-      <a:minorFont>
-        <a:latin typeface="Arial"/>
-        <a:ea typeface=""/>
-        <a:cs typeface=""/>
-        <a:font script="Jpan" typeface="ＭＳ Ｐゴシック"/>
-        <a:font script="Hang" typeface="맑은 고딕"/>
-        <a:font script="Hans" typeface="宋体"/>
-        <a:font script="Hant" typeface="新細明體"/>
-        <a:font script="Arab" typeface="Arial"/>
-        <a:font script="Hebr" typeface="Arial"/>
-        <a:font script="Thai" typeface="Cordia New"/>
-        <a:font script="Ethi" typeface="Nyala"/>
-        <a:font script="Beng" typeface="Vrinda"/>
-        <a:font script="Gujr" typeface="Shruti"/>
-        <a:font script="Khmr" typeface="DaunPenh"/>
-        <a:font script="Knda" typeface="Tunga"/>
-        <a:font script="Guru" typeface="Raavi"/>
-        <a:font script="Cans" typeface="Euphemia"/>
-        <a:font script="Cher" typeface="Plantagenet Cherokee"/>
-        <a:font script="Yiii" typeface="Microsoft Yi Baiti"/>
-        <a:font script="Tibt" typeface="Microsoft Himalaya"/>
-        <a:font script="Thaa" typeface="MV Boli"/>
-        <a:font script="Deva" typeface="Mangal"/>
-        <a:font script="Telu" typeface="Gautami"/>
-        <a:font script="Taml" typeface="Latha"/>
-        <a:font script="Syrc" typeface="Estrangelo Edessa"/>
-        <a:font script="Orya" typeface="Kalinga"/>
-        <a:font script="Mlym" typeface="Kartika"/>
-        <a:font script="Laoo" typeface="DokChampa"/>
-        <a:font script="Sinh" typeface="Iskoola Pota"/>
-        <a:font script="Mong" typeface="Mongolian Baiti"/>
-        <a:font script="Viet" typeface="Arial"/>
-        <a:font script="Uigh" typeface="Microsoft Uighur"/>
-        <a:font script="Geor" typeface="Sylfaen"/>
-      </a:minorFont>
-    </a:fontScheme>
-    <a:fmtScheme name="Office">
-      <a:fillStyleLst>
-        <a:solidFill>
-          <a:schemeClr val="phClr"/>
-        </a:solidFill>
-        <a:gradFill rotWithShape="1">
-          <a:gsLst>
-            <a:gs pos="0">
-              <a:schemeClr val="phClr">
-                <a:tint val="50000"/>
-                <a:satMod val="300000"/>
-              </a:schemeClr>
-            </a:gs>
-            <a:gs pos="35000">
-              <a:schemeClr val="phClr">
-                <a:tint val="37000"/>
-                <a:satMod val="300000"/>
-              </a:schemeClr>
-            </a:gs>
-            <a:gs pos="100000">
-              <a:schemeClr val="phClr">
-                <a:tint val="15000"/>
-                <a:satMod val="350000"/>
-              </a:schemeClr>
-            </a:gs>
-          </a:gsLst>
-          <a:lin ang="16200000" scaled="1"/>
-        </a:gradFill>
-        <a:gradFill rotWithShape="1">
-          <a:gsLst>
-            <a:gs pos="0">
-              <a:schemeClr val="phClr">
-                <a:tint val="100000"/>
-                <a:shade val="100000"/>
-                <a:satMod val="130000"/>
-              </a:schemeClr>
-            </a:gs>
-            <a:gs pos="100000">
-              <a:schemeClr val="phClr">
-                <a:tint val="50000"/>
-                <a:shade val="100000"/>
-                <a:satMod val="350000"/>
-              </a:schemeClr>
-            </a:gs>
-          </a:gsLst>
-          <a:lin ang="16200000" scaled="0"/>
-        </a:gradFill>
-      </a:fillStyleLst>
-      <a:lnStyleLst>
-        <a:ln w="9525" cap="flat" cmpd="sng" algn="ctr">
-          <a:solidFill>
-            <a:schemeClr val="phClr">
-              <a:shade val="95000"/>
-              <a:satMod val="105000"/>
-            </a:schemeClr>
-          </a:solidFill>
-          <a:prstDash val="solid"/>
-        </a:ln>
-        <a:ln w="25400" cap="flat" cmpd="sng" algn="ctr">
-          <a:solidFill>
-            <a:schemeClr val="phClr"/>
-          </a:solidFill>
-          <a:prstDash val="solid"/>
-        </a:ln>
-        <a:ln w="38100" cap="flat" cmpd="sng" algn="ctr">
-          <a:solidFill>
-            <a:schemeClr val="phClr"/>
-          </a:solidFill>
-          <a:prstDash val="solid"/>
-        </a:ln>
-      </a:lnStyleLst>
-      <a:effectStyleLst>
-        <a:effectStyle>
-          <a:effectLst>
-            <a:outerShdw blurRad="40000" dist="20000" dir="5400000" rotWithShape="0">
-              <a:srgbClr val="000000">
-                <a:alpha val="38000"/>
-              </a:srgbClr>
-            </a:outerShdw>
-          </a:effectLst>
-        </a:effectStyle>
-        <a:effectStyle>
-          <a:effectLst>
-            <a:outerShdw blurRad="40000" dist="23000" dir="5400000" rotWithShape="0">
-              <a:srgbClr val="000000">
-                <a:alpha val="35000"/>
-              </a:srgbClr>
-            </a:outerShdw>
-          </a:effectLst>
-        </a:effectStyle>
-        <a:effectStyle>
-          <a:effectLst>
-            <a:outerShdw blurRad="40000" dist="23000" dir="5400000" rotWithShape="0">
-              <a:srgbClr val="000000">
-                <a:alpha val="35000"/>
-              </a:srgbClr>
-            </a:outerShdw>
-          </a:effectLst>
-          <a:scene3d>
-            <a:camera prst="orthographicFront">
-              <a:rot lat="0" lon="0" rev="0"/>
-            </a:camera>
-            <a:lightRig rig="threePt" dir="t">
-              <a:rot lat="0" lon="0" rev="1200000"/>
-            </a:lightRig>
-          </a:scene3d>
-          <a:sp3d>
-            <a:bevelT w="63500" h="25400"/>
-          </a:sp3d>
-        </a:effectStyle>
-      </a:effectStyleLst>
-      <a:bgFillStyleLst>
-        <a:solidFill>
-          <a:schemeClr val="phClr"/>
-        </a:solidFill>
-        <a:gradFill rotWithShape="1">
-          <a:gsLst>
-            <a:gs pos="0">
-              <a:schemeClr val="phClr">
-                <a:tint val="40000"/>
-                <a:satMod val="350000"/>
-              </a:schemeClr>
-            </a:gs>
-            <a:gs pos="40000">
-              <a:schemeClr val="phClr">
-                <a:tint val="45000"/>
-                <a:shade val="99000"/>
-                <a:satMod val="350000"/>
-              </a:schemeClr>
-            </a:gs>
-            <a:gs pos="100000">
-              <a:schemeClr val="phClr">
-                <a:shade val="20000"/>
-                <a:satMod val="255000"/>
-              </a:schemeClr>
-            </a:gs>
-          </a:gsLst>
-          <a:path path="circle">
-            <a:fillToRect l="50000" t="-80000" r="50000" b="180000"/>
-          </a:path>
-        </a:gradFill>
-        <a:gradFill rotWithShape="1">
-          <a:gsLst>
-            <a:gs pos="0">
-              <a:schemeClr val="phClr">
-                <a:tint val="80000"/>
-                <a:satMod val="300000"/>
-              </a:schemeClr>
-            </a:gs>
-            <a:gs pos="100000">
-              <a:schemeClr val="phClr">
-                <a:shade val="30000"/>
-                <a:satMod val="200000"/>
-              </a:schemeClr>
-            </a:gs>
-          </a:gsLst>
-          <a:path path="circle">
-            <a:fillToRect l="50000" t="50000" r="50000" b="50000"/>
-          </a:path>
-        </a:gradFill>
-      </a:bgFillStyleLst>
-    </a:fmtScheme>
-  </a:themeElements>
-</a:theme>
 </file>
</xml_diff>